<commit_message>
Revert "Merge branch 'main' of https://github.com/hwaet/LD48 into main"
This reverts commit 2c44437d81179c0f7f58eef7d0b98c1ab383ea4a, reversing
changes made to 3e8452471109adda5904420c374d8b95a4f4577a.
</commit_message>
<xml_diff>
--- a/Assets/Instructions/Source.pptx
+++ b/Assets/Instructions/Source.pptx
@@ -118,11 +118,6 @@
       </a:defRPr>
     </a:lvl9pPr>
   </p:defaultTextStyle>
-  <p:extLst>
-    <p:ext uri="{EFAFB233-063F-42B5-8137-9DF3F51BA10A}">
-      <p15:sldGuideLst xmlns:p15="http://schemas.microsoft.com/office/powerpoint/2012/main"/>
-    </p:ext>
-  </p:extLst>
 </p:presentation>
 </file>
 
@@ -3637,7 +3632,7 @@
             </a:endParaRPr>
           </a:p>
           <a:p>
-            <a:pPr marL="0" indent="0" algn="ctr">
+            <a:pPr marL="0" indent="0" algn="just">
               <a:buNone/>
             </a:pPr>
             <a:r>
@@ -3683,7 +3678,7 @@
             </a:endParaRPr>
           </a:p>
           <a:p>
-            <a:pPr marL="0" indent="0" algn="ctr">
+            <a:pPr marL="0" indent="0" algn="just">
               <a:buNone/>
             </a:pPr>
             <a:r>
@@ -3813,9 +3808,12 @@
             <a:pPr marL="0" indent="0" algn="just">
               <a:buNone/>
             </a:pPr>
-            <a:endParaRPr lang="en-US" sz="2800" dirty="0">
-              <a:latin typeface="Permanent Marker" panose="02000000000000000000" pitchFamily="2" charset="0"/>
-            </a:endParaRPr>
+            <a:r>
+              <a:rPr lang="en-US" dirty="0">
+                <a:latin typeface="Permanent Marker" panose="02000000000000000000" pitchFamily="2" charset="0"/>
+              </a:rPr>
+              <a:t>[pic of plate]</a:t>
+            </a:r>
           </a:p>
           <a:p>
             <a:pPr marL="0" indent="0" algn="just">
@@ -3848,6 +3846,12 @@
             <a:pPr marL="0" indent="0" algn="just">
               <a:buNone/>
             </a:pPr>
+            <a:r>
+              <a:rPr lang="en-US" dirty="0">
+                <a:latin typeface="Permanent Marker" panose="02000000000000000000" pitchFamily="2" charset="0"/>
+              </a:rPr>
+              <a:t>[pic of plate]</a:t>
+            </a:r>
             <a:endParaRPr lang="en-US" sz="2800" dirty="0">
               <a:latin typeface="Permanent Marker" panose="02000000000000000000" pitchFamily="2" charset="0"/>
             </a:endParaRPr>
@@ -3911,78 +3915,6 @@
           </a:p>
         </p:txBody>
       </p:sp>
-      <p:pic>
-        <p:nvPicPr>
-          <p:cNvPr id="3" name="Picture 2">
-            <a:extLst>
-              <a:ext uri="{FF2B5EF4-FFF2-40B4-BE49-F238E27FC236}">
-                <a16:creationId xmlns:a16="http://schemas.microsoft.com/office/drawing/2014/main" id="{B73D2F64-429F-440F-BDAB-BE01F3587C37}"/>
-              </a:ext>
-            </a:extLst>
-          </p:cNvPr>
-          <p:cNvPicPr>
-            <a:picLocks noChangeAspect="1"/>
-          </p:cNvPicPr>
-          <p:nvPr/>
-        </p:nvPicPr>
-        <p:blipFill>
-          <a:blip r:embed="rId2">
-            <a:extLst>
-              <a:ext uri="{28A0092B-C50C-407E-A947-70E740481C1C}">
-                <a14:useLocalDpi xmlns:a14="http://schemas.microsoft.com/office/drawing/2010/main" val="0"/>
-              </a:ext>
-            </a:extLst>
-          </a:blip>
-          <a:stretch>
-            <a:fillRect/>
-          </a:stretch>
-        </p:blipFill>
-        <p:spPr>
-          <a:xfrm>
-            <a:off x="5372354" y="1966273"/>
-            <a:ext cx="1447291" cy="1417552"/>
-          </a:xfrm>
-          <a:prstGeom prst="rect">
-            <a:avLst/>
-          </a:prstGeom>
-        </p:spPr>
-      </p:pic>
-      <p:pic>
-        <p:nvPicPr>
-          <p:cNvPr id="6" name="Picture 5" descr="A picture containing underpants&#10;&#10;Description automatically generated">
-            <a:extLst>
-              <a:ext uri="{FF2B5EF4-FFF2-40B4-BE49-F238E27FC236}">
-                <a16:creationId xmlns:a16="http://schemas.microsoft.com/office/drawing/2014/main" id="{E56C658E-3603-4C73-9CA3-28A413828EA8}"/>
-              </a:ext>
-            </a:extLst>
-          </p:cNvPr>
-          <p:cNvPicPr>
-            <a:picLocks noChangeAspect="1"/>
-          </p:cNvPicPr>
-          <p:nvPr/>
-        </p:nvPicPr>
-        <p:blipFill>
-          <a:blip r:embed="rId3">
-            <a:extLst>
-              <a:ext uri="{28A0092B-C50C-407E-A947-70E740481C1C}">
-                <a14:useLocalDpi xmlns:a14="http://schemas.microsoft.com/office/drawing/2010/main" val="0"/>
-              </a:ext>
-            </a:extLst>
-          </a:blip>
-          <a:stretch>
-            <a:fillRect/>
-          </a:stretch>
-        </p:blipFill>
-        <p:spPr>
-          <a:xfrm>
-            <a:off x="5372354" y="4475831"/>
-            <a:ext cx="1447291" cy="1440350"/>
-          </a:xfrm>
-          <a:prstGeom prst="rect">
-            <a:avLst/>
-          </a:prstGeom>
-        </p:spPr>
-      </p:pic>
     </p:spTree>
     <p:extLst>
       <p:ext uri="{BB962C8B-B14F-4D97-AF65-F5344CB8AC3E}">
@@ -4117,7 +4049,18 @@
             </a:endParaRPr>
           </a:p>
           <a:p>
-            <a:pPr marL="0" indent="0" algn="ctr">
+            <a:pPr marL="0" indent="0" algn="just">
+              <a:buNone/>
+            </a:pPr>
+            <a:r>
+              <a:rPr lang="en-US" sz="2800" dirty="0">
+                <a:latin typeface="Permanent Marker" panose="02000000000000000000" pitchFamily="2" charset="0"/>
+              </a:rPr>
+              <a:t>[picture of cooked turducken]</a:t>
+            </a:r>
+          </a:p>
+          <a:p>
+            <a:pPr marL="0" indent="0" algn="just">
               <a:buNone/>
             </a:pPr>
             <a:endParaRPr lang="en-US" sz="2800" dirty="0">
@@ -4172,42 +4115,6 @@
           </a:p>
         </p:txBody>
       </p:sp>
-      <p:pic>
-        <p:nvPicPr>
-          <p:cNvPr id="3" name="Picture 2">
-            <a:extLst>
-              <a:ext uri="{FF2B5EF4-FFF2-40B4-BE49-F238E27FC236}">
-                <a16:creationId xmlns:a16="http://schemas.microsoft.com/office/drawing/2014/main" id="{A6BA765A-DD7B-481B-BC3B-7C65E5BEDD44}"/>
-              </a:ext>
-            </a:extLst>
-          </p:cNvPr>
-          <p:cNvPicPr>
-            <a:picLocks noChangeAspect="1"/>
-          </p:cNvPicPr>
-          <p:nvPr/>
-        </p:nvPicPr>
-        <p:blipFill>
-          <a:blip r:embed="rId2">
-            <a:extLst>
-              <a:ext uri="{28A0092B-C50C-407E-A947-70E740481C1C}">
-                <a14:useLocalDpi xmlns:a14="http://schemas.microsoft.com/office/drawing/2010/main" val="0"/>
-              </a:ext>
-            </a:extLst>
-          </a:blip>
-          <a:stretch>
-            <a:fillRect/>
-          </a:stretch>
-        </p:blipFill>
-        <p:spPr>
-          <a:xfrm>
-            <a:off x="4222189" y="4019765"/>
-            <a:ext cx="3747621" cy="2321662"/>
-          </a:xfrm>
-          <a:prstGeom prst="rect">
-            <a:avLst/>
-          </a:prstGeom>
-        </p:spPr>
-      </p:pic>
     </p:spTree>
     <p:extLst>
       <p:ext uri="{BB962C8B-B14F-4D97-AF65-F5344CB8AC3E}">
@@ -4293,7 +4200,7 @@
             </a:endParaRPr>
           </a:p>
           <a:p>
-            <a:pPr marL="0" indent="0" algn="ctr">
+            <a:pPr marL="0" indent="0" algn="just">
               <a:buNone/>
             </a:pPr>
             <a:r>
@@ -4525,7 +4432,7 @@
             <a:pPr marL="0" indent="0" algn="just">
               <a:buNone/>
             </a:pPr>
-            <a:endParaRPr lang="en-US" dirty="0">
+            <a:endParaRPr lang="en-US" sz="2800" dirty="0">
               <a:latin typeface="Permanent Marker" panose="02000000000000000000" pitchFamily="2" charset="0"/>
             </a:endParaRPr>
           </a:p>
@@ -4537,16 +4444,20 @@
               <a:rPr lang="en-US" sz="2800" dirty="0">
                 <a:latin typeface="Permanent Marker" panose="02000000000000000000" pitchFamily="2" charset="0"/>
               </a:rPr>
-              <a:t>				-&gt;			     -&gt;</a:t>
-            </a:r>
-          </a:p>
-          <a:p>
-            <a:pPr marL="0" indent="0" algn="just">
-              <a:buNone/>
-            </a:pPr>
-            <a:endParaRPr lang="en-US" sz="2800" dirty="0">
-              <a:latin typeface="Permanent Marker" panose="02000000000000000000" pitchFamily="2" charset="0"/>
-            </a:endParaRPr>
+              <a:t>[picture of sequence - chicken &gt; </a:t>
+            </a:r>
+            <a:r>
+              <a:rPr lang="en-US" sz="2800" dirty="0" err="1">
+                <a:latin typeface="Permanent Marker" panose="02000000000000000000" pitchFamily="2" charset="0"/>
+              </a:rPr>
+              <a:t>ducken</a:t>
+            </a:r>
+            <a:r>
+              <a:rPr lang="en-US" sz="2800" dirty="0">
+                <a:latin typeface="Permanent Marker" panose="02000000000000000000" pitchFamily="2" charset="0"/>
+              </a:rPr>
+              <a:t> &gt; turducken]</a:t>
+            </a:r>
           </a:p>
           <a:p>
             <a:pPr marL="0" indent="0" algn="just">
@@ -4604,114 +4515,6 @@
           </a:p>
         </p:txBody>
       </p:sp>
-      <p:pic>
-        <p:nvPicPr>
-          <p:cNvPr id="3" name="Picture 2" descr="A picture containing outdoor, light&#10;&#10;Description automatically generated">
-            <a:extLst>
-              <a:ext uri="{FF2B5EF4-FFF2-40B4-BE49-F238E27FC236}">
-                <a16:creationId xmlns:a16="http://schemas.microsoft.com/office/drawing/2014/main" id="{7264AB82-B53F-495F-AA51-E2C0F96F7AFF}"/>
-              </a:ext>
-            </a:extLst>
-          </p:cNvPr>
-          <p:cNvPicPr>
-            <a:picLocks noChangeAspect="1"/>
-          </p:cNvPicPr>
-          <p:nvPr/>
-        </p:nvPicPr>
-        <p:blipFill>
-          <a:blip r:embed="rId2">
-            <a:extLst>
-              <a:ext uri="{28A0092B-C50C-407E-A947-70E740481C1C}">
-                <a14:useLocalDpi xmlns:a14="http://schemas.microsoft.com/office/drawing/2010/main" val="0"/>
-              </a:ext>
-            </a:extLst>
-          </a:blip>
-          <a:stretch>
-            <a:fillRect/>
-          </a:stretch>
-        </p:blipFill>
-        <p:spPr>
-          <a:xfrm>
-            <a:off x="5439078" y="3902474"/>
-            <a:ext cx="1313843" cy="2366717"/>
-          </a:xfrm>
-          <a:prstGeom prst="rect">
-            <a:avLst/>
-          </a:prstGeom>
-        </p:spPr>
-      </p:pic>
-      <p:pic>
-        <p:nvPicPr>
-          <p:cNvPr id="6" name="Picture 5" descr="Chart&#10;&#10;Description automatically generated">
-            <a:extLst>
-              <a:ext uri="{FF2B5EF4-FFF2-40B4-BE49-F238E27FC236}">
-                <a16:creationId xmlns:a16="http://schemas.microsoft.com/office/drawing/2014/main" id="{5522EF25-86CE-420B-BB75-4E30AA38308E}"/>
-              </a:ext>
-            </a:extLst>
-          </p:cNvPr>
-          <p:cNvPicPr>
-            <a:picLocks noChangeAspect="1"/>
-          </p:cNvPicPr>
-          <p:nvPr/>
-        </p:nvPicPr>
-        <p:blipFill>
-          <a:blip r:embed="rId3">
-            <a:extLst>
-              <a:ext uri="{28A0092B-C50C-407E-A947-70E740481C1C}">
-                <a14:useLocalDpi xmlns:a14="http://schemas.microsoft.com/office/drawing/2010/main" val="0"/>
-              </a:ext>
-            </a:extLst>
-          </a:blip>
-          <a:stretch>
-            <a:fillRect/>
-          </a:stretch>
-        </p:blipFill>
-        <p:spPr>
-          <a:xfrm>
-            <a:off x="2324530" y="4313767"/>
-            <a:ext cx="790019" cy="1544128"/>
-          </a:xfrm>
-          <a:prstGeom prst="rect">
-            <a:avLst/>
-          </a:prstGeom>
-        </p:spPr>
-      </p:pic>
-      <p:pic>
-        <p:nvPicPr>
-          <p:cNvPr id="8" name="Picture 7">
-            <a:extLst>
-              <a:ext uri="{FF2B5EF4-FFF2-40B4-BE49-F238E27FC236}">
-                <a16:creationId xmlns:a16="http://schemas.microsoft.com/office/drawing/2014/main" id="{2F70EF31-1A5F-4CBF-8608-19700E8465C5}"/>
-              </a:ext>
-            </a:extLst>
-          </p:cNvPr>
-          <p:cNvPicPr>
-            <a:picLocks noChangeAspect="1"/>
-          </p:cNvPicPr>
-          <p:nvPr/>
-        </p:nvPicPr>
-        <p:blipFill>
-          <a:blip r:embed="rId4">
-            <a:extLst>
-              <a:ext uri="{28A0092B-C50C-407E-A947-70E740481C1C}">
-                <a14:useLocalDpi xmlns:a14="http://schemas.microsoft.com/office/drawing/2010/main" val="0"/>
-              </a:ext>
-            </a:extLst>
-          </a:blip>
-          <a:stretch>
-            <a:fillRect/>
-          </a:stretch>
-        </p:blipFill>
-        <p:spPr>
-          <a:xfrm>
-            <a:off x="8859914" y="3771218"/>
-            <a:ext cx="1724940" cy="2629227"/>
-          </a:xfrm>
-          <a:prstGeom prst="rect">
-            <a:avLst/>
-          </a:prstGeom>
-        </p:spPr>
-      </p:pic>
     </p:spTree>
     <p:extLst>
       <p:ext uri="{BB962C8B-B14F-4D97-AF65-F5344CB8AC3E}">
@@ -4827,7 +4630,7 @@
             </a:endParaRPr>
           </a:p>
           <a:p>
-            <a:pPr marL="0" indent="0" algn="ctr">
+            <a:pPr marL="0" indent="0" algn="just">
               <a:buNone/>
             </a:pPr>
             <a:r>
@@ -4984,51 +4787,46 @@
             <a:pPr marL="0" indent="0" algn="just">
               <a:buNone/>
             </a:pPr>
-            <a:endParaRPr lang="en-US" dirty="0">
-              <a:latin typeface="Permanent Marker" panose="02000000000000000000" pitchFamily="2" charset="0"/>
-            </a:endParaRPr>
-          </a:p>
-          <a:p>
-            <a:pPr marL="0" indent="0" algn="just">
-              <a:buNone/>
-            </a:pPr>
-            <a:endParaRPr lang="en-US" sz="2800" dirty="0">
-              <a:latin typeface="Permanent Marker" panose="02000000000000000000" pitchFamily="2" charset="0"/>
-            </a:endParaRPr>
-          </a:p>
-          <a:p>
-            <a:pPr marL="0" indent="0" algn="just">
-              <a:buNone/>
-            </a:pPr>
-            <a:endParaRPr lang="en-US" sz="2800" dirty="0">
-              <a:latin typeface="Permanent Marker" panose="02000000000000000000" pitchFamily="2" charset="0"/>
-            </a:endParaRPr>
-          </a:p>
-          <a:p>
-            <a:pPr marL="0" indent="0" algn="just">
-              <a:buNone/>
-            </a:pPr>
-            <a:endParaRPr lang="en-US" sz="2800" dirty="0">
-              <a:latin typeface="Permanent Marker" panose="02000000000000000000" pitchFamily="2" charset="0"/>
-            </a:endParaRPr>
-          </a:p>
-          <a:p>
-            <a:pPr marL="0" indent="0" algn="just">
-              <a:buNone/>
-            </a:pPr>
-            <a:endParaRPr lang="en-US" sz="2800" dirty="0">
-              <a:latin typeface="Permanent Marker" panose="02000000000000000000" pitchFamily="2" charset="0"/>
-            </a:endParaRPr>
-          </a:p>
-          <a:p>
-            <a:pPr marL="0" indent="0" algn="just">
-              <a:buNone/>
-            </a:pPr>
             <a:r>
               <a:rPr lang="en-US" sz="2800" dirty="0">
                 <a:latin typeface="Permanent Marker" panose="02000000000000000000" pitchFamily="2" charset="0"/>
               </a:rPr>
               <a:t>perform an action to dump the chicken into the container</a:t>
+            </a:r>
+          </a:p>
+          <a:p>
+            <a:pPr marL="0" indent="0" algn="just">
+              <a:buNone/>
+            </a:pPr>
+            <a:endParaRPr lang="en-US" sz="2800" dirty="0">
+              <a:latin typeface="Permanent Marker" panose="02000000000000000000" pitchFamily="2" charset="0"/>
+            </a:endParaRPr>
+          </a:p>
+          <a:p>
+            <a:pPr marL="0" indent="0" algn="just">
+              <a:buNone/>
+            </a:pPr>
+            <a:endParaRPr lang="en-US" sz="2800" dirty="0">
+              <a:latin typeface="Permanent Marker" panose="02000000000000000000" pitchFamily="2" charset="0"/>
+            </a:endParaRPr>
+          </a:p>
+          <a:p>
+            <a:pPr marL="0" indent="0" algn="just">
+              <a:buNone/>
+            </a:pPr>
+            <a:endParaRPr lang="en-US" sz="2800" dirty="0">
+              <a:latin typeface="Permanent Marker" panose="02000000000000000000" pitchFamily="2" charset="0"/>
+            </a:endParaRPr>
+          </a:p>
+          <a:p>
+            <a:pPr marL="0" indent="0" algn="just">
+              <a:buNone/>
+            </a:pPr>
+            <a:r>
+              <a:rPr lang="en-US" sz="2800" dirty="0">
+                <a:latin typeface="Permanent Marker" panose="02000000000000000000" pitchFamily="2" charset="0"/>
+              </a:rPr>
+              <a:t>[picture of takeout container with chicken]</a:t>
             </a:r>
           </a:p>
         </p:txBody>
@@ -5071,42 +4869,6 @@
           </a:p>
         </p:txBody>
       </p:sp>
-      <p:pic>
-        <p:nvPicPr>
-          <p:cNvPr id="3" name="Picture 2">
-            <a:extLst>
-              <a:ext uri="{FF2B5EF4-FFF2-40B4-BE49-F238E27FC236}">
-                <a16:creationId xmlns:a16="http://schemas.microsoft.com/office/drawing/2014/main" id="{A238E58B-2566-4EBD-A6D1-C0355BC29466}"/>
-              </a:ext>
-            </a:extLst>
-          </p:cNvPr>
-          <p:cNvPicPr>
-            <a:picLocks noChangeAspect="1"/>
-          </p:cNvPicPr>
-          <p:nvPr/>
-        </p:nvPicPr>
-        <p:blipFill>
-          <a:blip r:embed="rId2">
-            <a:extLst>
-              <a:ext uri="{28A0092B-C50C-407E-A947-70E740481C1C}">
-                <a14:useLocalDpi xmlns:a14="http://schemas.microsoft.com/office/drawing/2010/main" val="0"/>
-              </a:ext>
-            </a:extLst>
-          </a:blip>
-          <a:stretch>
-            <a:fillRect/>
-          </a:stretch>
-        </p:blipFill>
-        <p:spPr>
-          <a:xfrm>
-            <a:off x="5256753" y="2676406"/>
-            <a:ext cx="1678494" cy="2355234"/>
-          </a:xfrm>
-          <a:prstGeom prst="rect">
-            <a:avLst/>
-          </a:prstGeom>
-        </p:spPr>
-      </p:pic>
     </p:spTree>
     <p:extLst>
       <p:ext uri="{BB962C8B-B14F-4D97-AF65-F5344CB8AC3E}">
@@ -5209,20 +4971,12 @@
             <a:pPr marL="0" indent="0" algn="just">
               <a:buNone/>
             </a:pPr>
-            <a:endParaRPr lang="en-US" dirty="0">
-              <a:latin typeface="Permanent Marker" panose="02000000000000000000" pitchFamily="2" charset="0"/>
-            </a:endParaRPr>
-          </a:p>
-          <a:p>
-            <a:pPr marL="0" indent="0" algn="just">
-              <a:buNone/>
-            </a:pPr>
             <a:endParaRPr lang="en-US" sz="2800" dirty="0">
               <a:latin typeface="Permanent Marker" panose="02000000000000000000" pitchFamily="2" charset="0"/>
             </a:endParaRPr>
           </a:p>
           <a:p>
-            <a:pPr marL="0" indent="0" algn="ctr">
+            <a:pPr marL="0" indent="0" algn="just">
               <a:buNone/>
             </a:pPr>
             <a:r>
@@ -5357,7 +5111,7 @@
             </a:endParaRPr>
           </a:p>
           <a:p>
-            <a:pPr marL="0" indent="0" algn="ctr">
+            <a:pPr marL="0" indent="0" algn="just">
               <a:buNone/>
             </a:pPr>
             <a:r>
@@ -5541,9 +5295,12 @@
             <a:pPr marL="0" indent="0" algn="just">
               <a:buNone/>
             </a:pPr>
-            <a:endParaRPr lang="en-US" sz="2800" dirty="0">
-              <a:latin typeface="Permanent Marker" panose="02000000000000000000" pitchFamily="2" charset="0"/>
-            </a:endParaRPr>
+            <a:r>
+              <a:rPr lang="en-US" sz="2800" dirty="0">
+                <a:latin typeface="Permanent Marker" panose="02000000000000000000" pitchFamily="2" charset="0"/>
+              </a:rPr>
+              <a:t>[pictures of duck and turkey]</a:t>
+            </a:r>
           </a:p>
           <a:p>
             <a:pPr marL="0" indent="0" algn="just">
@@ -5620,78 +5377,6 @@
           </a:p>
         </p:txBody>
       </p:sp>
-      <p:pic>
-        <p:nvPicPr>
-          <p:cNvPr id="3" name="Picture 2">
-            <a:extLst>
-              <a:ext uri="{FF2B5EF4-FFF2-40B4-BE49-F238E27FC236}">
-                <a16:creationId xmlns:a16="http://schemas.microsoft.com/office/drawing/2014/main" id="{59E06C21-EA1C-4373-96A5-2011A3E1F4D7}"/>
-              </a:ext>
-            </a:extLst>
-          </p:cNvPr>
-          <p:cNvPicPr>
-            <a:picLocks noChangeAspect="1"/>
-          </p:cNvPicPr>
-          <p:nvPr/>
-        </p:nvPicPr>
-        <p:blipFill>
-          <a:blip r:embed="rId2">
-            <a:extLst>
-              <a:ext uri="{28A0092B-C50C-407E-A947-70E740481C1C}">
-                <a14:useLocalDpi xmlns:a14="http://schemas.microsoft.com/office/drawing/2010/main" val="0"/>
-              </a:ext>
-            </a:extLst>
-          </a:blip>
-          <a:stretch>
-            <a:fillRect/>
-          </a:stretch>
-        </p:blipFill>
-        <p:spPr>
-          <a:xfrm>
-            <a:off x="7309141" y="3246834"/>
-            <a:ext cx="1618629" cy="2040702"/>
-          </a:xfrm>
-          <a:prstGeom prst="rect">
-            <a:avLst/>
-          </a:prstGeom>
-        </p:spPr>
-      </p:pic>
-      <p:pic>
-        <p:nvPicPr>
-          <p:cNvPr id="6" name="Picture 5">
-            <a:extLst>
-              <a:ext uri="{FF2B5EF4-FFF2-40B4-BE49-F238E27FC236}">
-                <a16:creationId xmlns:a16="http://schemas.microsoft.com/office/drawing/2014/main" id="{E5D9C5D5-7E45-49DA-88A3-130D8EC7480D}"/>
-              </a:ext>
-            </a:extLst>
-          </p:cNvPr>
-          <p:cNvPicPr>
-            <a:picLocks noChangeAspect="1"/>
-          </p:cNvPicPr>
-          <p:nvPr/>
-        </p:nvPicPr>
-        <p:blipFill>
-          <a:blip r:embed="rId3">
-            <a:extLst>
-              <a:ext uri="{28A0092B-C50C-407E-A947-70E740481C1C}">
-                <a14:useLocalDpi xmlns:a14="http://schemas.microsoft.com/office/drawing/2010/main" val="0"/>
-              </a:ext>
-            </a:extLst>
-          </a:blip>
-          <a:stretch>
-            <a:fillRect/>
-          </a:stretch>
-        </p:blipFill>
-        <p:spPr>
-          <a:xfrm>
-            <a:off x="3476739" y="3456655"/>
-            <a:ext cx="841309" cy="1621059"/>
-          </a:xfrm>
-          <a:prstGeom prst="rect">
-            <a:avLst/>
-          </a:prstGeom>
-        </p:spPr>
-      </p:pic>
     </p:spTree>
     <p:extLst>
       <p:ext uri="{BB962C8B-B14F-4D97-AF65-F5344CB8AC3E}">

</xml_diff>